<commit_message>
int function type 2
</commit_message>
<xml_diff>
--- a/data/Presentation8.pptx
+++ b/data/Presentation8.pptx
@@ -8,6 +8,7 @@
     <p:sldId id="256" r:id="rId2"/>
     <p:sldId id="257" r:id="rId3"/>
     <p:sldId id="258" r:id="rId4"/>
+    <p:sldId id="259" r:id="rId5"/>
   </p:sldIdLst>
   <p:sldSz cx="12192000" cy="6858000"/>
   <p:notesSz cx="6858000" cy="9144000"/>
@@ -263,7 +264,7 @@
           <a:p>
             <a:fld id="{1FE92FA6-FAD4-0645-864D-1B07ACDEE985}" type="datetimeFigureOut">
               <a:rPr lang="en-DK" smtClean="0"/>
-              <a:t>22/02/2023</a:t>
+              <a:t>23/02/2023</a:t>
             </a:fld>
             <a:endParaRPr lang="en-DK"/>
           </a:p>
@@ -463,7 +464,7 @@
           <a:p>
             <a:fld id="{1FE92FA6-FAD4-0645-864D-1B07ACDEE985}" type="datetimeFigureOut">
               <a:rPr lang="en-DK" smtClean="0"/>
-              <a:t>22/02/2023</a:t>
+              <a:t>23/02/2023</a:t>
             </a:fld>
             <a:endParaRPr lang="en-DK"/>
           </a:p>
@@ -673,7 +674,7 @@
           <a:p>
             <a:fld id="{1FE92FA6-FAD4-0645-864D-1B07ACDEE985}" type="datetimeFigureOut">
               <a:rPr lang="en-DK" smtClean="0"/>
-              <a:t>22/02/2023</a:t>
+              <a:t>23/02/2023</a:t>
             </a:fld>
             <a:endParaRPr lang="en-DK"/>
           </a:p>
@@ -873,7 +874,7 @@
           <a:p>
             <a:fld id="{1FE92FA6-FAD4-0645-864D-1B07ACDEE985}" type="datetimeFigureOut">
               <a:rPr lang="en-DK" smtClean="0"/>
-              <a:t>22/02/2023</a:t>
+              <a:t>23/02/2023</a:t>
             </a:fld>
             <a:endParaRPr lang="en-DK"/>
           </a:p>
@@ -1149,7 +1150,7 @@
           <a:p>
             <a:fld id="{1FE92FA6-FAD4-0645-864D-1B07ACDEE985}" type="datetimeFigureOut">
               <a:rPr lang="en-DK" smtClean="0"/>
-              <a:t>22/02/2023</a:t>
+              <a:t>23/02/2023</a:t>
             </a:fld>
             <a:endParaRPr lang="en-DK"/>
           </a:p>
@@ -1417,7 +1418,7 @@
           <a:p>
             <a:fld id="{1FE92FA6-FAD4-0645-864D-1B07ACDEE985}" type="datetimeFigureOut">
               <a:rPr lang="en-DK" smtClean="0"/>
-              <a:t>22/02/2023</a:t>
+              <a:t>23/02/2023</a:t>
             </a:fld>
             <a:endParaRPr lang="en-DK"/>
           </a:p>
@@ -1832,7 +1833,7 @@
           <a:p>
             <a:fld id="{1FE92FA6-FAD4-0645-864D-1B07ACDEE985}" type="datetimeFigureOut">
               <a:rPr lang="en-DK" smtClean="0"/>
-              <a:t>22/02/2023</a:t>
+              <a:t>23/02/2023</a:t>
             </a:fld>
             <a:endParaRPr lang="en-DK"/>
           </a:p>
@@ -1974,7 +1975,7 @@
           <a:p>
             <a:fld id="{1FE92FA6-FAD4-0645-864D-1B07ACDEE985}" type="datetimeFigureOut">
               <a:rPr lang="en-DK" smtClean="0"/>
-              <a:t>22/02/2023</a:t>
+              <a:t>23/02/2023</a:t>
             </a:fld>
             <a:endParaRPr lang="en-DK"/>
           </a:p>
@@ -2087,7 +2088,7 @@
           <a:p>
             <a:fld id="{1FE92FA6-FAD4-0645-864D-1B07ACDEE985}" type="datetimeFigureOut">
               <a:rPr lang="en-DK" smtClean="0"/>
-              <a:t>22/02/2023</a:t>
+              <a:t>23/02/2023</a:t>
             </a:fld>
             <a:endParaRPr lang="en-DK"/>
           </a:p>
@@ -2400,7 +2401,7 @@
           <a:p>
             <a:fld id="{1FE92FA6-FAD4-0645-864D-1B07ACDEE985}" type="datetimeFigureOut">
               <a:rPr lang="en-DK" smtClean="0"/>
-              <a:t>22/02/2023</a:t>
+              <a:t>23/02/2023</a:t>
             </a:fld>
             <a:endParaRPr lang="en-DK"/>
           </a:p>
@@ -2689,7 +2690,7 @@
           <a:p>
             <a:fld id="{1FE92FA6-FAD4-0645-864D-1B07ACDEE985}" type="datetimeFigureOut">
               <a:rPr lang="en-DK" smtClean="0"/>
-              <a:t>22/02/2023</a:t>
+              <a:t>23/02/2023</a:t>
             </a:fld>
             <a:endParaRPr lang="en-DK"/>
           </a:p>
@@ -2932,7 +2933,7 @@
           <a:p>
             <a:fld id="{1FE92FA6-FAD4-0645-864D-1B07ACDEE985}" type="datetimeFigureOut">
               <a:rPr lang="en-DK" smtClean="0"/>
-              <a:t>22/02/2023</a:t>
+              <a:t>23/02/2023</a:t>
             </a:fld>
             <a:endParaRPr lang="en-DK"/>
           </a:p>
@@ -3928,6 +3929,174 @@
 </p:sld>
 </file>
 
+<file path=ppt/slides/slide4.xml><?xml version="1.0" encoding="utf-8"?>
+<p:sld xmlns:a="http://schemas.openxmlformats.org/drawingml/2006/main" xmlns:r="http://schemas.openxmlformats.org/officeDocument/2006/relationships" xmlns:p="http://schemas.openxmlformats.org/presentationml/2006/main">
+  <p:cSld>
+    <p:spTree>
+      <p:nvGrpSpPr>
+        <p:cNvPr id="1" name=""/>
+        <p:cNvGrpSpPr/>
+        <p:nvPr/>
+      </p:nvGrpSpPr>
+      <p:grpSpPr>
+        <a:xfrm>
+          <a:off x="0" y="0"/>
+          <a:ext cx="0" cy="0"/>
+          <a:chOff x="0" y="0"/>
+          <a:chExt cx="0" cy="0"/>
+        </a:xfrm>
+      </p:grpSpPr>
+      <p:pic>
+        <p:nvPicPr>
+          <p:cNvPr id="4" name="Picture 3">
+            <a:extLst>
+              <a:ext uri="{FF2B5EF4-FFF2-40B4-BE49-F238E27FC236}">
+                <a16:creationId xmlns:a16="http://schemas.microsoft.com/office/drawing/2014/main" id="{6BDDF87A-16CC-9503-EFC4-9B3222BE8EF8}"/>
+              </a:ext>
+            </a:extLst>
+          </p:cNvPr>
+          <p:cNvPicPr>
+            <a:picLocks noChangeAspect="1"/>
+          </p:cNvPicPr>
+          <p:nvPr/>
+        </p:nvPicPr>
+        <p:blipFill>
+          <a:blip r:embed="rId2"/>
+          <a:stretch>
+            <a:fillRect/>
+          </a:stretch>
+        </p:blipFill>
+        <p:spPr>
+          <a:xfrm>
+            <a:off x="1455449" y="2594449"/>
+            <a:ext cx="4178300" cy="1943100"/>
+          </a:xfrm>
+          <a:prstGeom prst="rect">
+            <a:avLst/>
+          </a:prstGeom>
+        </p:spPr>
+      </p:pic>
+      <p:pic>
+        <p:nvPicPr>
+          <p:cNvPr id="5" name="Picture 4">
+            <a:extLst>
+              <a:ext uri="{FF2B5EF4-FFF2-40B4-BE49-F238E27FC236}">
+                <a16:creationId xmlns:a16="http://schemas.microsoft.com/office/drawing/2014/main" id="{55ECA0E9-85A5-5C6B-7BCA-5AF20AA1D4DD}"/>
+              </a:ext>
+            </a:extLst>
+          </p:cNvPr>
+          <p:cNvPicPr>
+            <a:picLocks noChangeAspect="1"/>
+          </p:cNvPicPr>
+          <p:nvPr/>
+        </p:nvPicPr>
+        <p:blipFill>
+          <a:blip r:embed="rId3"/>
+          <a:stretch>
+            <a:fillRect/>
+          </a:stretch>
+        </p:blipFill>
+        <p:spPr>
+          <a:xfrm>
+            <a:off x="6331465" y="3108239"/>
+            <a:ext cx="4521200" cy="1333500"/>
+          </a:xfrm>
+          <a:prstGeom prst="rect">
+            <a:avLst/>
+          </a:prstGeom>
+        </p:spPr>
+      </p:pic>
+      <p:sp>
+        <p:nvSpPr>
+          <p:cNvPr id="6" name="TextBox 5">
+            <a:extLst>
+              <a:ext uri="{FF2B5EF4-FFF2-40B4-BE49-F238E27FC236}">
+                <a16:creationId xmlns:a16="http://schemas.microsoft.com/office/drawing/2014/main" id="{A9374F0C-BAB7-589A-1EDF-37342DE759C0}"/>
+              </a:ext>
+            </a:extLst>
+          </p:cNvPr>
+          <p:cNvSpPr txBox="1"/>
+          <p:nvPr/>
+        </p:nvSpPr>
+        <p:spPr>
+          <a:xfrm>
+            <a:off x="2891481" y="1915297"/>
+            <a:ext cx="1655805" cy="369332"/>
+          </a:xfrm>
+          <a:prstGeom prst="rect">
+            <a:avLst/>
+          </a:prstGeom>
+          <a:noFill/>
+        </p:spPr>
+        <p:txBody>
+          <a:bodyPr wrap="square" rtlCol="0">
+            <a:spAutoFit/>
+          </a:bodyPr>
+          <a:lstStyle/>
+          <a:p>
+            <a:r>
+              <a:rPr lang="en-GB" dirty="0"/>
+              <a:t>n</a:t>
+            </a:r>
+            <a:r>
+              <a:rPr lang="en-DK" dirty="0"/>
+              <a:t>o wall</a:t>
+            </a:r>
+          </a:p>
+        </p:txBody>
+      </p:sp>
+      <p:sp>
+        <p:nvSpPr>
+          <p:cNvPr id="7" name="TextBox 6">
+            <a:extLst>
+              <a:ext uri="{FF2B5EF4-FFF2-40B4-BE49-F238E27FC236}">
+                <a16:creationId xmlns:a16="http://schemas.microsoft.com/office/drawing/2014/main" id="{30A2C9D0-9326-6351-A44A-FCA7F2F129C4}"/>
+              </a:ext>
+            </a:extLst>
+          </p:cNvPr>
+          <p:cNvSpPr txBox="1"/>
+          <p:nvPr/>
+        </p:nvSpPr>
+        <p:spPr>
+          <a:xfrm>
+            <a:off x="8246076" y="1915297"/>
+            <a:ext cx="1655805" cy="369332"/>
+          </a:xfrm>
+          <a:prstGeom prst="rect">
+            <a:avLst/>
+          </a:prstGeom>
+          <a:noFill/>
+        </p:spPr>
+        <p:txBody>
+          <a:bodyPr wrap="square" rtlCol="0">
+            <a:spAutoFit/>
+          </a:bodyPr>
+          <a:lstStyle/>
+          <a:p>
+            <a:r>
+              <a:rPr lang="en-US" dirty="0"/>
+              <a:t>with </a:t>
+            </a:r>
+            <a:r>
+              <a:rPr lang="en-DK" dirty="0"/>
+              <a:t>wall</a:t>
+            </a:r>
+          </a:p>
+        </p:txBody>
+      </p:sp>
+    </p:spTree>
+    <p:extLst>
+      <p:ext uri="{BB962C8B-B14F-4D97-AF65-F5344CB8AC3E}">
+        <p14:creationId xmlns:p14="http://schemas.microsoft.com/office/powerpoint/2010/main" val="3831787517"/>
+      </p:ext>
+    </p:extLst>
+  </p:cSld>
+  <p:clrMapOvr>
+    <a:masterClrMapping/>
+  </p:clrMapOvr>
+</p:sld>
+</file>
+
 <file path=ppt/theme/theme1.xml><?xml version="1.0" encoding="utf-8"?>
 <a:theme xmlns:a="http://schemas.openxmlformats.org/drawingml/2006/main" name="Office Theme">
   <a:themeElements>

</xml_diff>